<commit_message>
Link to survey results
Survey results proofread.
</commit_message>
<xml_diff>
--- a/Documentation/Audit_2/Powerpoint/Audit_Presentation.pptx
+++ b/Documentation/Audit_2/Powerpoint/Audit_Presentation.pptx
@@ -317,7 +317,7 @@
                         <a:cs typeface="+mn-cs"/>
                       </a:defRPr>
                     </a:pPr>
-                    <a:fld id="{1FA08148-7C53-4AAF-A998-82A6965EA6D0}" type="CELLRANGE">
+                    <a:fld id="{0007C368-613F-4B50-8745-40B937ED1732}" type="CELLRANGE">
                       <a:rPr lang="en-US" baseline="0" dirty="0"/>
                       <a:pPr>
                         <a:defRPr b="1"/>
@@ -328,7 +328,7 @@
                       <a:rPr lang="en-US" baseline="0" dirty="0"/>
                       <a:t>: </a:t>
                     </a:r>
-                    <a:fld id="{E63A57D5-B96C-450F-B216-A7D3D43A53A3}" type="VALUE">
+                    <a:fld id="{D058E527-FAC8-420C-9364-DDD8ACAD9253}" type="VALUE">
                       <a:rPr lang="en-US" baseline="0" dirty="0"/>
                       <a:pPr>
                         <a:defRPr b="1"/>
@@ -400,7 +400,7 @@
                   <a:bodyPr/>
                   <a:lstStyle/>
                   <a:p>
-                    <a:fld id="{85CF8642-984F-4142-89A6-DDE4E6AFBFF0}" type="CELLRANGE">
+                    <a:fld id="{FED9D156-50C5-44C3-8A97-003B1C0B3CAE}" type="CELLRANGE">
                       <a:rPr lang="en-US"/>
                       <a:pPr/>
                       <a:t>[CELLRANGE]</a:t>
@@ -409,7 +409,7 @@
                       <a:rPr lang="en-US" baseline="0"/>
                       <a:t>: </a:t>
                     </a:r>
-                    <a:fld id="{A30FE0E0-1951-4F57-B460-B3DA9A07FA6A}" type="VALUE">
+                    <a:fld id="{689D35C0-3B59-4F60-94A4-EA3C55DE780A}" type="VALUE">
                       <a:rPr lang="en-US" baseline="0"/>
                       <a:pPr/>
                       <a:t>[VALUE]</a:t>
@@ -446,7 +446,7 @@
                   <a:bodyPr/>
                   <a:lstStyle/>
                   <a:p>
-                    <a:fld id="{EA9D38D7-D207-4DC0-9D53-F3458426A858}" type="CELLRANGE">
+                    <a:fld id="{4D41E3D7-DEE8-4A53-B345-A379189B84A6}" type="CELLRANGE">
                       <a:rPr lang="en-US"/>
                       <a:pPr/>
                       <a:t>[CELLRANGE]</a:t>
@@ -455,7 +455,7 @@
                       <a:rPr lang="en-US" baseline="0"/>
                       <a:t>: </a:t>
                     </a:r>
-                    <a:fld id="{0ECD57CD-C251-4588-B3C8-FD673FB63179}" type="VALUE">
+                    <a:fld id="{C6CCAC78-0865-4BBC-A811-57685E60869D}" type="VALUE">
                       <a:rPr lang="en-US" baseline="0"/>
                       <a:pPr/>
                       <a:t>[VALUE]</a:t>
@@ -823,7 +823,7 @@
                   <a:bodyPr/>
                   <a:lstStyle/>
                   <a:p>
-                    <a:fld id="{320345BD-A75E-4BBF-A5D5-1DE33975DC28}" type="CELLRANGE">
+                    <a:fld id="{2A384E70-9332-477F-90B7-41C01369002B}" type="CELLRANGE">
                       <a:rPr lang="en-US"/>
                       <a:pPr/>
                       <a:t>[CELLRANGE]</a:t>
@@ -832,7 +832,7 @@
                       <a:rPr lang="en-US" baseline="0"/>
                       <a:t>: </a:t>
                     </a:r>
-                    <a:fld id="{DB05D552-EA6B-43D5-929F-F7E00D687B82}" type="VALUE">
+                    <a:fld id="{8E20BC01-9EF3-4CB9-8EAA-91C153253D4E}" type="VALUE">
                       <a:rPr lang="en-US" baseline="0"/>
                       <a:pPr/>
                       <a:t>[VALUE]</a:t>
@@ -869,7 +869,7 @@
                   <a:bodyPr/>
                   <a:lstStyle/>
                   <a:p>
-                    <a:fld id="{9A953186-8C8A-4ED5-A53B-50C7DCAA3CBE}" type="CELLRANGE">
+                    <a:fld id="{A15635F2-B8A6-4047-86B9-4C0295748185}" type="CELLRANGE">
                       <a:rPr lang="en-US"/>
                       <a:pPr/>
                       <a:t>[CELLRANGE]</a:t>
@@ -878,7 +878,7 @@
                       <a:rPr lang="en-US" baseline="0"/>
                       <a:t>: </a:t>
                     </a:r>
-                    <a:fld id="{8C39D47E-F926-4328-91AF-7B1E07D294A4}" type="VALUE">
+                    <a:fld id="{AEE7E887-9865-4BFC-BFA7-4F6D66F2AF2B}" type="VALUE">
                       <a:rPr lang="en-US" baseline="0"/>
                       <a:pPr/>
                       <a:t>[VALUE]</a:t>
@@ -915,7 +915,7 @@
                   <a:bodyPr/>
                   <a:lstStyle/>
                   <a:p>
-                    <a:fld id="{FA39F721-84D3-43B9-9C51-7ED58DC425DB}" type="CELLRANGE">
+                    <a:fld id="{7E1D372C-B7AD-4770-BAC4-C165D76F6E9B}" type="CELLRANGE">
                       <a:rPr lang="en-US"/>
                       <a:pPr/>
                       <a:t>[CELLRANGE]</a:t>
@@ -924,7 +924,7 @@
                       <a:rPr lang="en-US" baseline="0"/>
                       <a:t>: </a:t>
                     </a:r>
-                    <a:fld id="{AE0C27B7-FA00-4130-9744-8BD033DA2626}" type="VALUE">
+                    <a:fld id="{EB4362E8-5F83-4DAA-A101-D1857CBD61B5}" type="VALUE">
                       <a:rPr lang="en-US" baseline="0"/>
                       <a:pPr/>
                       <a:t>[VALUE]</a:t>
@@ -2373,7 +2373,7 @@
           <a:p>
             <a:fld id="{CBA3A4ED-0D4E-42B1-A475-12869A2FA002}" type="datetimeFigureOut">
               <a:rPr lang="en-NZ" smtClean="0"/>
-              <a:t>25/03/2018</a:t>
+              <a:t>26/03/2018</a:t>
             </a:fld>
             <a:endParaRPr lang="en-NZ"/>
           </a:p>
@@ -2893,7 +2893,7 @@
           <a:p>
             <a:fld id="{3A571A71-22B1-40B0-82E9-B94787CC5DE0}" type="datetimeFigureOut">
               <a:rPr lang="en-AU" smtClean="0"/>
-              <a:t>25/03/2018</a:t>
+              <a:t>26/03/2018</a:t>
             </a:fld>
             <a:endParaRPr lang="en-AU"/>
           </a:p>
@@ -3121,7 +3121,7 @@
           <a:p>
             <a:fld id="{3A571A71-22B1-40B0-82E9-B94787CC5DE0}" type="datetimeFigureOut">
               <a:rPr lang="en-AU" smtClean="0"/>
-              <a:t>25/03/2018</a:t>
+              <a:t>26/03/2018</a:t>
             </a:fld>
             <a:endParaRPr lang="en-AU"/>
           </a:p>
@@ -3301,7 +3301,7 @@
           <a:p>
             <a:fld id="{3A571A71-22B1-40B0-82E9-B94787CC5DE0}" type="datetimeFigureOut">
               <a:rPr lang="en-AU" smtClean="0"/>
-              <a:t>25/03/2018</a:t>
+              <a:t>26/03/2018</a:t>
             </a:fld>
             <a:endParaRPr lang="en-AU"/>
           </a:p>
@@ -3471,7 +3471,7 @@
           <a:p>
             <a:fld id="{3A571A71-22B1-40B0-82E9-B94787CC5DE0}" type="datetimeFigureOut">
               <a:rPr lang="en-AU" smtClean="0"/>
-              <a:t>25/03/2018</a:t>
+              <a:t>26/03/2018</a:t>
             </a:fld>
             <a:endParaRPr lang="en-AU"/>
           </a:p>
@@ -3725,7 +3725,7 @@
           <a:p>
             <a:fld id="{3A571A71-22B1-40B0-82E9-B94787CC5DE0}" type="datetimeFigureOut">
               <a:rPr lang="en-AU" smtClean="0"/>
-              <a:t>25/03/2018</a:t>
+              <a:t>26/03/2018</a:t>
             </a:fld>
             <a:endParaRPr lang="en-AU"/>
           </a:p>
@@ -4051,7 +4051,7 @@
           <a:p>
             <a:fld id="{3A571A71-22B1-40B0-82E9-B94787CC5DE0}" type="datetimeFigureOut">
               <a:rPr lang="en-AU" smtClean="0"/>
-              <a:t>25/03/2018</a:t>
+              <a:t>26/03/2018</a:t>
             </a:fld>
             <a:endParaRPr lang="en-AU"/>
           </a:p>
@@ -4502,7 +4502,7 @@
           <a:p>
             <a:fld id="{3A571A71-22B1-40B0-82E9-B94787CC5DE0}" type="datetimeFigureOut">
               <a:rPr lang="en-AU" smtClean="0"/>
-              <a:t>25/03/2018</a:t>
+              <a:t>26/03/2018</a:t>
             </a:fld>
             <a:endParaRPr lang="en-AU"/>
           </a:p>
@@ -4620,7 +4620,7 @@
           <a:p>
             <a:fld id="{3A571A71-22B1-40B0-82E9-B94787CC5DE0}" type="datetimeFigureOut">
               <a:rPr lang="en-AU" smtClean="0"/>
-              <a:t>25/03/2018</a:t>
+              <a:t>26/03/2018</a:t>
             </a:fld>
             <a:endParaRPr lang="en-AU"/>
           </a:p>
@@ -4715,7 +4715,7 @@
           <a:p>
             <a:fld id="{3A571A71-22B1-40B0-82E9-B94787CC5DE0}" type="datetimeFigureOut">
               <a:rPr lang="en-AU" smtClean="0"/>
-              <a:t>25/03/2018</a:t>
+              <a:t>26/03/2018</a:t>
             </a:fld>
             <a:endParaRPr lang="en-AU"/>
           </a:p>
@@ -5002,7 +5002,7 @@
           <a:p>
             <a:fld id="{3A571A71-22B1-40B0-82E9-B94787CC5DE0}" type="datetimeFigureOut">
               <a:rPr lang="en-AU" smtClean="0"/>
-              <a:t>25/03/2018</a:t>
+              <a:t>26/03/2018</a:t>
             </a:fld>
             <a:endParaRPr lang="en-AU"/>
           </a:p>
@@ -5324,7 +5324,7 @@
           <a:p>
             <a:fld id="{3A571A71-22B1-40B0-82E9-B94787CC5DE0}" type="datetimeFigureOut">
               <a:rPr lang="en-AU" smtClean="0"/>
-              <a:t>25/03/2018</a:t>
+              <a:t>26/03/2018</a:t>
             </a:fld>
             <a:endParaRPr lang="en-AU"/>
           </a:p>
@@ -5578,7 +5578,7 @@
           <a:p>
             <a:fld id="{3A571A71-22B1-40B0-82E9-B94787CC5DE0}" type="datetimeFigureOut">
               <a:rPr lang="en-AU" smtClean="0"/>
-              <a:t>25/03/2018</a:t>
+              <a:t>26/03/2018</a:t>
             </a:fld>
             <a:endParaRPr lang="en-AU"/>
           </a:p>
@@ -23947,11 +23947,7 @@
             </a:pPr>
             <a:r>
               <a:rPr lang="en-US" sz="1400" kern="1200" dirty="0" smtClean="0"/>
-              <a:t>Large unbiased </a:t>
-            </a:r>
-            <a:r>
-              <a:rPr lang="en-US" sz="1400" kern="1200" dirty="0" smtClean="0"/>
-              <a:t>sample</a:t>
+              <a:t>Large unbiased sample</a:t>
             </a:r>
             <a:endParaRPr lang="en-US" sz="1400" kern="1200" dirty="0"/>
           </a:p>
@@ -24008,7 +24004,7 @@
             </a:pPr>
             <a:r>
               <a:rPr lang="en-US" sz="1400" kern="1200" dirty="0" smtClean="0"/>
-              <a:t>Planning and Performance Measurement (PPM)</a:t>
+              <a:t>PPM</a:t>
             </a:r>
             <a:endParaRPr lang="en-US" sz="1400" kern="1200" dirty="0"/>
           </a:p>
@@ -24027,7 +24023,29 @@
             </a:pPr>
             <a:r>
               <a:rPr lang="en-US" sz="1400" kern="1200" dirty="0" smtClean="0"/>
-              <a:t>Recommended action: Ethics approval</a:t>
+              <a:t>Survey approved</a:t>
+            </a:r>
+          </a:p>
+          <a:p>
+            <a:pPr marL="114300" lvl="1" indent="-114300" algn="l" defTabSz="622300">
+              <a:lnSpc>
+                <a:spcPct val="100000"/>
+              </a:lnSpc>
+              <a:spcBef>
+                <a:spcPct val="0"/>
+              </a:spcBef>
+              <a:spcAft>
+                <a:spcPct val="15000"/>
+              </a:spcAft>
+              <a:buChar char="••"/>
+            </a:pPr>
+            <a:r>
+              <a:rPr lang="en-US" sz="1400" kern="1200" dirty="0" smtClean="0"/>
+              <a:t>Recommended </a:t>
+            </a:r>
+            <a:r>
+              <a:rPr lang="en-US" sz="1400" kern="1200" dirty="0" smtClean="0"/>
+              <a:t>action: Ethics approval</a:t>
             </a:r>
             <a:endParaRPr lang="en-US" sz="1400" kern="1200" dirty="0"/>
           </a:p>

</xml_diff>